<commit_message>
hide slides in moreselectors ppt
</commit_message>
<xml_diff>
--- a/Session8CssSelectors/MoreSelectors.pptx
+++ b/Session8CssSelectors/MoreSelectors.pptx
@@ -231,7 +231,7 @@
           <a:p>
             <a:fld id="{19104133-B5B0-4351-8158-4F0E5EB1E2BF}" type="datetimeFigureOut">
               <a:rPr lang="en-US" smtClean="0"/>
-              <a:t>5/28/2021</a:t>
+              <a:t>7/20/2021</a:t>
             </a:fld>
             <a:endParaRPr lang="en-US"/>
           </a:p>
@@ -1622,7 +1622,7 @@
             <a:fld id="{1C2D31DE-C454-491C-B5C3-F097855E3DF7}" type="datetime4">
               <a:rPr lang="en-US" smtClean="0"/>
               <a:pPr/>
-              <a:t>May 28, 2021</a:t>
+              <a:t>July 20, 2021</a:t>
             </a:fld>
             <a:endParaRPr lang="en-US" dirty="0"/>
           </a:p>
@@ -5014,7 +5014,7 @@
           <a:p>
             <a:fld id="{5958763E-B898-436D-883D-03711491D54A}" type="datetimeFigureOut">
               <a:rPr lang="en-US" smtClean="0"/>
-              <a:t>5/28/2021</a:t>
+              <a:t>7/20/2021</a:t>
             </a:fld>
             <a:endParaRPr lang="en-US"/>
           </a:p>
@@ -5207,7 +5207,7 @@
           <a:p>
             <a:fld id="{5958763E-B898-436D-883D-03711491D54A}" type="datetimeFigureOut">
               <a:rPr lang="en-US" smtClean="0"/>
-              <a:t>5/28/2021</a:t>
+              <a:t>7/20/2021</a:t>
             </a:fld>
             <a:endParaRPr lang="en-US"/>
           </a:p>
@@ -5457,7 +5457,7 @@
           <a:p>
             <a:fld id="{5958763E-B898-436D-883D-03711491D54A}" type="datetimeFigureOut">
               <a:rPr lang="en-US" smtClean="0"/>
-              <a:t>5/28/2021</a:t>
+              <a:t>7/20/2021</a:t>
             </a:fld>
             <a:endParaRPr lang="en-US"/>
           </a:p>
@@ -5805,7 +5805,7 @@
           <a:p>
             <a:fld id="{5958763E-B898-436D-883D-03711491D54A}" type="datetimeFigureOut">
               <a:rPr lang="en-US" smtClean="0"/>
-              <a:t>5/28/2021</a:t>
+              <a:t>7/20/2021</a:t>
             </a:fld>
             <a:endParaRPr lang="en-US"/>
           </a:p>
@@ -6221,7 +6221,7 @@
           <a:p>
             <a:fld id="{5958763E-B898-436D-883D-03711491D54A}" type="datetimeFigureOut">
               <a:rPr lang="en-US" smtClean="0"/>
-              <a:t>5/28/2021</a:t>
+              <a:t>7/20/2021</a:t>
             </a:fld>
             <a:endParaRPr lang="en-US"/>
           </a:p>
@@ -6722,7 +6722,7 @@
           <a:p>
             <a:fld id="{5958763E-B898-436D-883D-03711491D54A}" type="datetimeFigureOut">
               <a:rPr lang="en-US" smtClean="0"/>
-              <a:t>5/28/2021</a:t>
+              <a:t>7/20/2021</a:t>
             </a:fld>
             <a:endParaRPr lang="en-US"/>
           </a:p>
@@ -7173,7 +7173,7 @@
           <a:p>
             <a:fld id="{5958763E-B898-436D-883D-03711491D54A}" type="datetimeFigureOut">
               <a:rPr lang="en-US" smtClean="0"/>
-              <a:t>5/28/2021</a:t>
+              <a:t>7/20/2021</a:t>
             </a:fld>
             <a:endParaRPr lang="en-US"/>
           </a:p>
@@ -7784,7 +7784,7 @@
           <a:p>
             <a:fld id="{5958763E-B898-436D-883D-03711491D54A}" type="datetimeFigureOut">
               <a:rPr lang="en-US" smtClean="0"/>
-              <a:t>5/28/2021</a:t>
+              <a:t>7/20/2021</a:t>
             </a:fld>
             <a:endParaRPr lang="en-US"/>
           </a:p>
@@ -8555,7 +8555,7 @@
           <a:p>
             <a:fld id="{5958763E-B898-436D-883D-03711491D54A}" type="datetimeFigureOut">
               <a:rPr lang="en-US" smtClean="0"/>
-              <a:t>5/28/2021</a:t>
+              <a:t>7/20/2021</a:t>
             </a:fld>
             <a:endParaRPr lang="en-US"/>
           </a:p>
@@ -8659,7 +8659,7 @@
           <a:p>
             <a:fld id="{5958763E-B898-436D-883D-03711491D54A}" type="datetimeFigureOut">
               <a:rPr lang="en-US" smtClean="0"/>
-              <a:t>5/28/2021</a:t>
+              <a:t>7/20/2021</a:t>
             </a:fld>
             <a:endParaRPr lang="en-US"/>
           </a:p>
@@ -8986,7 +8986,7 @@
             <a:fld id="{1C2D31DE-C454-491C-B5C3-F097855E3DF7}" type="datetime4">
               <a:rPr lang="en-US" smtClean="0"/>
               <a:pPr/>
-              <a:t>May 28, 2021</a:t>
+              <a:t>July 20, 2021</a:t>
             </a:fld>
             <a:endParaRPr lang="en-US" dirty="0"/>
           </a:p>
@@ -12138,7 +12138,7 @@
           <a:p>
             <a:fld id="{5958763E-B898-436D-883D-03711491D54A}" type="datetimeFigureOut">
               <a:rPr lang="en-US" smtClean="0"/>
-              <a:t>5/28/2021</a:t>
+              <a:t>7/20/2021</a:t>
             </a:fld>
             <a:endParaRPr lang="en-US"/>
           </a:p>
@@ -12262,7 +12262,7 @@
           <a:p>
             <a:fld id="{5958763E-B898-436D-883D-03711491D54A}" type="datetimeFigureOut">
               <a:rPr lang="en-US" smtClean="0"/>
-              <a:t>5/28/2021</a:t>
+              <a:t>7/20/2021</a:t>
             </a:fld>
             <a:endParaRPr lang="en-US"/>
           </a:p>
@@ -12386,7 +12386,7 @@
           <a:p>
             <a:fld id="{5958763E-B898-436D-883D-03711491D54A}" type="datetimeFigureOut">
               <a:rPr lang="en-US" smtClean="0"/>
-              <a:t>5/28/2021</a:t>
+              <a:t>7/20/2021</a:t>
             </a:fld>
             <a:endParaRPr lang="en-US"/>
           </a:p>
@@ -12510,7 +12510,7 @@
           <a:p>
             <a:fld id="{5958763E-B898-436D-883D-03711491D54A}" type="datetimeFigureOut">
               <a:rPr lang="en-US" smtClean="0"/>
-              <a:t>5/28/2021</a:t>
+              <a:t>7/20/2021</a:t>
             </a:fld>
             <a:endParaRPr lang="en-US"/>
           </a:p>
@@ -12634,7 +12634,7 @@
           <a:p>
             <a:fld id="{5958763E-B898-436D-883D-03711491D54A}" type="datetimeFigureOut">
               <a:rPr lang="en-US" smtClean="0"/>
-              <a:t>5/28/2021</a:t>
+              <a:t>7/20/2021</a:t>
             </a:fld>
             <a:endParaRPr lang="en-US"/>
           </a:p>
@@ -12758,7 +12758,7 @@
           <a:p>
             <a:fld id="{5958763E-B898-436D-883D-03711491D54A}" type="datetimeFigureOut">
               <a:rPr lang="en-US" smtClean="0"/>
-              <a:t>5/28/2021</a:t>
+              <a:t>7/20/2021</a:t>
             </a:fld>
             <a:endParaRPr lang="en-US"/>
           </a:p>
@@ -12882,7 +12882,7 @@
           <a:p>
             <a:fld id="{5958763E-B898-436D-883D-03711491D54A}" type="datetimeFigureOut">
               <a:rPr lang="en-US" smtClean="0"/>
-              <a:t>5/28/2021</a:t>
+              <a:t>7/20/2021</a:t>
             </a:fld>
             <a:endParaRPr lang="en-US"/>
           </a:p>
@@ -13006,7 +13006,7 @@
           <a:p>
             <a:fld id="{5958763E-B898-436D-883D-03711491D54A}" type="datetimeFigureOut">
               <a:rPr lang="en-US" smtClean="0"/>
-              <a:t>5/28/2021</a:t>
+              <a:t>7/20/2021</a:t>
             </a:fld>
             <a:endParaRPr lang="en-US"/>
           </a:p>
@@ -13139,7 +13139,7 @@
           <a:p>
             <a:fld id="{5958763E-B898-436D-883D-03711491D54A}" type="datetimeFigureOut">
               <a:rPr lang="en-US" smtClean="0"/>
-              <a:t>5/28/2021</a:t>
+              <a:t>7/20/2021</a:t>
             </a:fld>
             <a:endParaRPr lang="en-US"/>
           </a:p>
@@ -16478,7 +16478,7 @@
             <a:fld id="{1C2D31DE-C454-491C-B5C3-F097855E3DF7}" type="datetime4">
               <a:rPr lang="en-US" smtClean="0"/>
               <a:pPr/>
-              <a:t>May 28, 2021</a:t>
+              <a:t>July 20, 2021</a:t>
             </a:fld>
             <a:endParaRPr lang="en-US" dirty="0"/>
           </a:p>
@@ -28714,7 +28714,7 @@
           <a:p>
             <a:fld id="{5958763E-B898-436D-883D-03711491D54A}" type="datetimeFigureOut">
               <a:rPr lang="en-US" smtClean="0"/>
-              <a:t>5/28/2021</a:t>
+              <a:t>7/20/2021</a:t>
             </a:fld>
             <a:endParaRPr lang="en-US"/>
           </a:p>
@@ -29116,7 +29116,7 @@
           <a:p>
             <a:fld id="{5958763E-B898-436D-883D-03711491D54A}" type="datetimeFigureOut">
               <a:rPr lang="en-US" smtClean="0"/>
-              <a:t>5/28/2021</a:t>
+              <a:t>7/20/2021</a:t>
             </a:fld>
             <a:endParaRPr lang="en-US"/>
           </a:p>
@@ -29410,7 +29410,7 @@
           <a:p>
             <a:fld id="{5958763E-B898-436D-883D-03711491D54A}" type="datetimeFigureOut">
               <a:rPr lang="en-US" smtClean="0"/>
-              <a:t>5/28/2021</a:t>
+              <a:t>7/20/2021</a:t>
             </a:fld>
             <a:endParaRPr lang="en-US"/>
           </a:p>
@@ -29611,7 +29611,7 @@
           <a:p>
             <a:fld id="{5958763E-B898-436D-883D-03711491D54A}" type="datetimeFigureOut">
               <a:rPr lang="en-US" smtClean="0"/>
-              <a:t>5/28/2021</a:t>
+              <a:t>7/20/2021</a:t>
             </a:fld>
             <a:endParaRPr lang="en-US"/>
           </a:p>
@@ -29872,7 +29872,7 @@
           <a:p>
             <a:fld id="{5958763E-B898-436D-883D-03711491D54A}" type="datetimeFigureOut">
               <a:rPr lang="en-US" smtClean="0"/>
-              <a:t>5/28/2021</a:t>
+              <a:t>7/20/2021</a:t>
             </a:fld>
             <a:endParaRPr lang="en-US"/>
           </a:p>
@@ -30380,7 +30380,7 @@
           <a:p>
             <a:fld id="{5958763E-B898-436D-883D-03711491D54A}" type="datetimeFigureOut">
               <a:rPr lang="en-US" smtClean="0"/>
-              <a:t>5/28/2021</a:t>
+              <a:t>7/20/2021</a:t>
             </a:fld>
             <a:endParaRPr lang="en-US"/>
           </a:p>
@@ -30859,7 +30859,7 @@
           <a:p>
             <a:fld id="{5958763E-B898-436D-883D-03711491D54A}" type="datetimeFigureOut">
               <a:rPr lang="en-US" smtClean="0"/>
-              <a:t>5/28/2021</a:t>
+              <a:t>7/20/2021</a:t>
             </a:fld>
             <a:endParaRPr lang="en-US"/>
           </a:p>
@@ -31678,7 +31678,7 @@
           <a:p>
             <a:fld id="{5958763E-B898-436D-883D-03711491D54A}" type="datetimeFigureOut">
               <a:rPr lang="en-US" smtClean="0"/>
-              <a:t>5/28/2021</a:t>
+              <a:t>7/20/2021</a:t>
             </a:fld>
             <a:endParaRPr lang="en-US"/>
           </a:p>
@@ -31879,7 +31879,7 @@
           <a:p>
             <a:fld id="{5958763E-B898-436D-883D-03711491D54A}" type="datetimeFigureOut">
               <a:rPr lang="en-US" smtClean="0"/>
-              <a:t>5/28/2021</a:t>
+              <a:t>7/20/2021</a:t>
             </a:fld>
             <a:endParaRPr lang="en-US"/>
           </a:p>
@@ -32214,7 +32214,7 @@
           <a:p>
             <a:fld id="{5958763E-B898-436D-883D-03711491D54A}" type="datetimeFigureOut">
               <a:rPr lang="en-US" smtClean="0"/>
-              <a:t>5/28/2021</a:t>
+              <a:t>7/20/2021</a:t>
             </a:fld>
             <a:endParaRPr lang="en-US"/>
           </a:p>
@@ -32444,7 +32444,7 @@
           <a:p>
             <a:fld id="{5958763E-B898-436D-883D-03711491D54A}" type="datetimeFigureOut">
               <a:rPr lang="en-US" smtClean="0"/>
-              <a:t>5/28/2021</a:t>
+              <a:t>7/20/2021</a:t>
             </a:fld>
             <a:endParaRPr lang="en-US"/>
           </a:p>
@@ -32688,7 +32688,7 @@
           <a:p>
             <a:fld id="{5958763E-B898-436D-883D-03711491D54A}" type="datetimeFigureOut">
               <a:rPr lang="en-US" smtClean="0"/>
-              <a:t>5/28/2021</a:t>
+              <a:t>7/20/2021</a:t>
             </a:fld>
             <a:endParaRPr lang="en-US"/>
           </a:p>
@@ -36235,7 +36235,7 @@
 </file>
 
 <file path=ppt/slides/slide10.xml><?xml version="1.0" encoding="utf-8"?>
-<p:sld xmlns:a="http://schemas.openxmlformats.org/drawingml/2006/main" xmlns:r="http://schemas.openxmlformats.org/officeDocument/2006/relationships" xmlns:p="http://schemas.openxmlformats.org/presentationml/2006/main">
+<p:sld xmlns:a="http://schemas.openxmlformats.org/drawingml/2006/main" xmlns:r="http://schemas.openxmlformats.org/officeDocument/2006/relationships" xmlns:p="http://schemas.openxmlformats.org/presentationml/2006/main" show="0">
   <p:cSld>
     <p:spTree>
       <p:nvGrpSpPr>
@@ -37191,7 +37191,7 @@
 </file>
 
 <file path=ppt/slides/slide11.xml><?xml version="1.0" encoding="utf-8"?>
-<p:sld xmlns:a="http://schemas.openxmlformats.org/drawingml/2006/main" xmlns:r="http://schemas.openxmlformats.org/officeDocument/2006/relationships" xmlns:p="http://schemas.openxmlformats.org/presentationml/2006/main">
+<p:sld xmlns:a="http://schemas.openxmlformats.org/drawingml/2006/main" xmlns:r="http://schemas.openxmlformats.org/officeDocument/2006/relationships" xmlns:p="http://schemas.openxmlformats.org/presentationml/2006/main" show="0">
   <p:cSld>
     <p:bg>
       <p:bgPr>
@@ -38810,7 +38810,7 @@
 </file>
 
 <file path=ppt/slides/slide5.xml><?xml version="1.0" encoding="utf-8"?>
-<p:sld xmlns:a="http://schemas.openxmlformats.org/drawingml/2006/main" xmlns:r="http://schemas.openxmlformats.org/officeDocument/2006/relationships" xmlns:p="http://schemas.openxmlformats.org/presentationml/2006/main">
+<p:sld xmlns:a="http://schemas.openxmlformats.org/drawingml/2006/main" xmlns:r="http://schemas.openxmlformats.org/officeDocument/2006/relationships" xmlns:p="http://schemas.openxmlformats.org/presentationml/2006/main" show="0">
   <p:cSld>
     <p:spTree>
       <p:nvGrpSpPr>
@@ -39550,7 +39550,7 @@
 </file>
 
 <file path=ppt/slides/slide7.xml><?xml version="1.0" encoding="utf-8"?>
-<p:sld xmlns:a="http://schemas.openxmlformats.org/drawingml/2006/main" xmlns:r="http://schemas.openxmlformats.org/officeDocument/2006/relationships" xmlns:p="http://schemas.openxmlformats.org/presentationml/2006/main">
+<p:sld xmlns:a="http://schemas.openxmlformats.org/drawingml/2006/main" xmlns:r="http://schemas.openxmlformats.org/officeDocument/2006/relationships" xmlns:p="http://schemas.openxmlformats.org/presentationml/2006/main" show="0">
   <p:cSld>
     <p:spTree>
       <p:nvGrpSpPr>
@@ -39842,7 +39842,7 @@
 </file>
 
 <file path=ppt/slides/slide8.xml><?xml version="1.0" encoding="utf-8"?>
-<p:sld xmlns:a="http://schemas.openxmlformats.org/drawingml/2006/main" xmlns:r="http://schemas.openxmlformats.org/officeDocument/2006/relationships" xmlns:p="http://schemas.openxmlformats.org/presentationml/2006/main">
+<p:sld xmlns:a="http://schemas.openxmlformats.org/drawingml/2006/main" xmlns:r="http://schemas.openxmlformats.org/officeDocument/2006/relationships" xmlns:p="http://schemas.openxmlformats.org/presentationml/2006/main" show="0">
   <p:cSld>
     <p:spTree>
       <p:nvGrpSpPr>
@@ -40306,7 +40306,7 @@
 </file>
 
 <file path=ppt/slides/slide9.xml><?xml version="1.0" encoding="utf-8"?>
-<p:sld xmlns:a="http://schemas.openxmlformats.org/drawingml/2006/main" xmlns:r="http://schemas.openxmlformats.org/officeDocument/2006/relationships" xmlns:p="http://schemas.openxmlformats.org/presentationml/2006/main">
+<p:sld xmlns:a="http://schemas.openxmlformats.org/drawingml/2006/main" xmlns:r="http://schemas.openxmlformats.org/officeDocument/2006/relationships" xmlns:p="http://schemas.openxmlformats.org/presentationml/2006/main" show="0">
   <p:cSld>
     <p:bg>
       <p:bgPr>

</xml_diff>

<commit_message>
Update gitbook 2021-07-20 14:54:26
</commit_message>
<xml_diff>
--- a/Session8CssSelectors/MoreSelectors.pptx
+++ b/Session8CssSelectors/MoreSelectors.pptx
@@ -231,7 +231,7 @@
           <a:p>
             <a:fld id="{19104133-B5B0-4351-8158-4F0E5EB1E2BF}" type="datetimeFigureOut">
               <a:rPr lang="en-US" smtClean="0"/>
-              <a:t>5/28/2021</a:t>
+              <a:t>7/20/2021</a:t>
             </a:fld>
             <a:endParaRPr lang="en-US"/>
           </a:p>
@@ -1622,7 +1622,7 @@
             <a:fld id="{1C2D31DE-C454-491C-B5C3-F097855E3DF7}" type="datetime4">
               <a:rPr lang="en-US" smtClean="0"/>
               <a:pPr/>
-              <a:t>May 28, 2021</a:t>
+              <a:t>July 20, 2021</a:t>
             </a:fld>
             <a:endParaRPr lang="en-US" dirty="0"/>
           </a:p>
@@ -5014,7 +5014,7 @@
           <a:p>
             <a:fld id="{5958763E-B898-436D-883D-03711491D54A}" type="datetimeFigureOut">
               <a:rPr lang="en-US" smtClean="0"/>
-              <a:t>5/28/2021</a:t>
+              <a:t>7/20/2021</a:t>
             </a:fld>
             <a:endParaRPr lang="en-US"/>
           </a:p>
@@ -5207,7 +5207,7 @@
           <a:p>
             <a:fld id="{5958763E-B898-436D-883D-03711491D54A}" type="datetimeFigureOut">
               <a:rPr lang="en-US" smtClean="0"/>
-              <a:t>5/28/2021</a:t>
+              <a:t>7/20/2021</a:t>
             </a:fld>
             <a:endParaRPr lang="en-US"/>
           </a:p>
@@ -5457,7 +5457,7 @@
           <a:p>
             <a:fld id="{5958763E-B898-436D-883D-03711491D54A}" type="datetimeFigureOut">
               <a:rPr lang="en-US" smtClean="0"/>
-              <a:t>5/28/2021</a:t>
+              <a:t>7/20/2021</a:t>
             </a:fld>
             <a:endParaRPr lang="en-US"/>
           </a:p>
@@ -5805,7 +5805,7 @@
           <a:p>
             <a:fld id="{5958763E-B898-436D-883D-03711491D54A}" type="datetimeFigureOut">
               <a:rPr lang="en-US" smtClean="0"/>
-              <a:t>5/28/2021</a:t>
+              <a:t>7/20/2021</a:t>
             </a:fld>
             <a:endParaRPr lang="en-US"/>
           </a:p>
@@ -6221,7 +6221,7 @@
           <a:p>
             <a:fld id="{5958763E-B898-436D-883D-03711491D54A}" type="datetimeFigureOut">
               <a:rPr lang="en-US" smtClean="0"/>
-              <a:t>5/28/2021</a:t>
+              <a:t>7/20/2021</a:t>
             </a:fld>
             <a:endParaRPr lang="en-US"/>
           </a:p>
@@ -6722,7 +6722,7 @@
           <a:p>
             <a:fld id="{5958763E-B898-436D-883D-03711491D54A}" type="datetimeFigureOut">
               <a:rPr lang="en-US" smtClean="0"/>
-              <a:t>5/28/2021</a:t>
+              <a:t>7/20/2021</a:t>
             </a:fld>
             <a:endParaRPr lang="en-US"/>
           </a:p>
@@ -7173,7 +7173,7 @@
           <a:p>
             <a:fld id="{5958763E-B898-436D-883D-03711491D54A}" type="datetimeFigureOut">
               <a:rPr lang="en-US" smtClean="0"/>
-              <a:t>5/28/2021</a:t>
+              <a:t>7/20/2021</a:t>
             </a:fld>
             <a:endParaRPr lang="en-US"/>
           </a:p>
@@ -7784,7 +7784,7 @@
           <a:p>
             <a:fld id="{5958763E-B898-436D-883D-03711491D54A}" type="datetimeFigureOut">
               <a:rPr lang="en-US" smtClean="0"/>
-              <a:t>5/28/2021</a:t>
+              <a:t>7/20/2021</a:t>
             </a:fld>
             <a:endParaRPr lang="en-US"/>
           </a:p>
@@ -8555,7 +8555,7 @@
           <a:p>
             <a:fld id="{5958763E-B898-436D-883D-03711491D54A}" type="datetimeFigureOut">
               <a:rPr lang="en-US" smtClean="0"/>
-              <a:t>5/28/2021</a:t>
+              <a:t>7/20/2021</a:t>
             </a:fld>
             <a:endParaRPr lang="en-US"/>
           </a:p>
@@ -8659,7 +8659,7 @@
           <a:p>
             <a:fld id="{5958763E-B898-436D-883D-03711491D54A}" type="datetimeFigureOut">
               <a:rPr lang="en-US" smtClean="0"/>
-              <a:t>5/28/2021</a:t>
+              <a:t>7/20/2021</a:t>
             </a:fld>
             <a:endParaRPr lang="en-US"/>
           </a:p>
@@ -8986,7 +8986,7 @@
             <a:fld id="{1C2D31DE-C454-491C-B5C3-F097855E3DF7}" type="datetime4">
               <a:rPr lang="en-US" smtClean="0"/>
               <a:pPr/>
-              <a:t>May 28, 2021</a:t>
+              <a:t>July 20, 2021</a:t>
             </a:fld>
             <a:endParaRPr lang="en-US" dirty="0"/>
           </a:p>
@@ -12138,7 +12138,7 @@
           <a:p>
             <a:fld id="{5958763E-B898-436D-883D-03711491D54A}" type="datetimeFigureOut">
               <a:rPr lang="en-US" smtClean="0"/>
-              <a:t>5/28/2021</a:t>
+              <a:t>7/20/2021</a:t>
             </a:fld>
             <a:endParaRPr lang="en-US"/>
           </a:p>
@@ -12262,7 +12262,7 @@
           <a:p>
             <a:fld id="{5958763E-B898-436D-883D-03711491D54A}" type="datetimeFigureOut">
               <a:rPr lang="en-US" smtClean="0"/>
-              <a:t>5/28/2021</a:t>
+              <a:t>7/20/2021</a:t>
             </a:fld>
             <a:endParaRPr lang="en-US"/>
           </a:p>
@@ -12386,7 +12386,7 @@
           <a:p>
             <a:fld id="{5958763E-B898-436D-883D-03711491D54A}" type="datetimeFigureOut">
               <a:rPr lang="en-US" smtClean="0"/>
-              <a:t>5/28/2021</a:t>
+              <a:t>7/20/2021</a:t>
             </a:fld>
             <a:endParaRPr lang="en-US"/>
           </a:p>
@@ -12510,7 +12510,7 @@
           <a:p>
             <a:fld id="{5958763E-B898-436D-883D-03711491D54A}" type="datetimeFigureOut">
               <a:rPr lang="en-US" smtClean="0"/>
-              <a:t>5/28/2021</a:t>
+              <a:t>7/20/2021</a:t>
             </a:fld>
             <a:endParaRPr lang="en-US"/>
           </a:p>
@@ -12634,7 +12634,7 @@
           <a:p>
             <a:fld id="{5958763E-B898-436D-883D-03711491D54A}" type="datetimeFigureOut">
               <a:rPr lang="en-US" smtClean="0"/>
-              <a:t>5/28/2021</a:t>
+              <a:t>7/20/2021</a:t>
             </a:fld>
             <a:endParaRPr lang="en-US"/>
           </a:p>
@@ -12758,7 +12758,7 @@
           <a:p>
             <a:fld id="{5958763E-B898-436D-883D-03711491D54A}" type="datetimeFigureOut">
               <a:rPr lang="en-US" smtClean="0"/>
-              <a:t>5/28/2021</a:t>
+              <a:t>7/20/2021</a:t>
             </a:fld>
             <a:endParaRPr lang="en-US"/>
           </a:p>
@@ -12882,7 +12882,7 @@
           <a:p>
             <a:fld id="{5958763E-B898-436D-883D-03711491D54A}" type="datetimeFigureOut">
               <a:rPr lang="en-US" smtClean="0"/>
-              <a:t>5/28/2021</a:t>
+              <a:t>7/20/2021</a:t>
             </a:fld>
             <a:endParaRPr lang="en-US"/>
           </a:p>
@@ -13006,7 +13006,7 @@
           <a:p>
             <a:fld id="{5958763E-B898-436D-883D-03711491D54A}" type="datetimeFigureOut">
               <a:rPr lang="en-US" smtClean="0"/>
-              <a:t>5/28/2021</a:t>
+              <a:t>7/20/2021</a:t>
             </a:fld>
             <a:endParaRPr lang="en-US"/>
           </a:p>
@@ -13139,7 +13139,7 @@
           <a:p>
             <a:fld id="{5958763E-B898-436D-883D-03711491D54A}" type="datetimeFigureOut">
               <a:rPr lang="en-US" smtClean="0"/>
-              <a:t>5/28/2021</a:t>
+              <a:t>7/20/2021</a:t>
             </a:fld>
             <a:endParaRPr lang="en-US"/>
           </a:p>
@@ -16478,7 +16478,7 @@
             <a:fld id="{1C2D31DE-C454-491C-B5C3-F097855E3DF7}" type="datetime4">
               <a:rPr lang="en-US" smtClean="0"/>
               <a:pPr/>
-              <a:t>May 28, 2021</a:t>
+              <a:t>July 20, 2021</a:t>
             </a:fld>
             <a:endParaRPr lang="en-US" dirty="0"/>
           </a:p>
@@ -28714,7 +28714,7 @@
           <a:p>
             <a:fld id="{5958763E-B898-436D-883D-03711491D54A}" type="datetimeFigureOut">
               <a:rPr lang="en-US" smtClean="0"/>
-              <a:t>5/28/2021</a:t>
+              <a:t>7/20/2021</a:t>
             </a:fld>
             <a:endParaRPr lang="en-US"/>
           </a:p>
@@ -29116,7 +29116,7 @@
           <a:p>
             <a:fld id="{5958763E-B898-436D-883D-03711491D54A}" type="datetimeFigureOut">
               <a:rPr lang="en-US" smtClean="0"/>
-              <a:t>5/28/2021</a:t>
+              <a:t>7/20/2021</a:t>
             </a:fld>
             <a:endParaRPr lang="en-US"/>
           </a:p>
@@ -29410,7 +29410,7 @@
           <a:p>
             <a:fld id="{5958763E-B898-436D-883D-03711491D54A}" type="datetimeFigureOut">
               <a:rPr lang="en-US" smtClean="0"/>
-              <a:t>5/28/2021</a:t>
+              <a:t>7/20/2021</a:t>
             </a:fld>
             <a:endParaRPr lang="en-US"/>
           </a:p>
@@ -29611,7 +29611,7 @@
           <a:p>
             <a:fld id="{5958763E-B898-436D-883D-03711491D54A}" type="datetimeFigureOut">
               <a:rPr lang="en-US" smtClean="0"/>
-              <a:t>5/28/2021</a:t>
+              <a:t>7/20/2021</a:t>
             </a:fld>
             <a:endParaRPr lang="en-US"/>
           </a:p>
@@ -29872,7 +29872,7 @@
           <a:p>
             <a:fld id="{5958763E-B898-436D-883D-03711491D54A}" type="datetimeFigureOut">
               <a:rPr lang="en-US" smtClean="0"/>
-              <a:t>5/28/2021</a:t>
+              <a:t>7/20/2021</a:t>
             </a:fld>
             <a:endParaRPr lang="en-US"/>
           </a:p>
@@ -30380,7 +30380,7 @@
           <a:p>
             <a:fld id="{5958763E-B898-436D-883D-03711491D54A}" type="datetimeFigureOut">
               <a:rPr lang="en-US" smtClean="0"/>
-              <a:t>5/28/2021</a:t>
+              <a:t>7/20/2021</a:t>
             </a:fld>
             <a:endParaRPr lang="en-US"/>
           </a:p>
@@ -30859,7 +30859,7 @@
           <a:p>
             <a:fld id="{5958763E-B898-436D-883D-03711491D54A}" type="datetimeFigureOut">
               <a:rPr lang="en-US" smtClean="0"/>
-              <a:t>5/28/2021</a:t>
+              <a:t>7/20/2021</a:t>
             </a:fld>
             <a:endParaRPr lang="en-US"/>
           </a:p>
@@ -31678,7 +31678,7 @@
           <a:p>
             <a:fld id="{5958763E-B898-436D-883D-03711491D54A}" type="datetimeFigureOut">
               <a:rPr lang="en-US" smtClean="0"/>
-              <a:t>5/28/2021</a:t>
+              <a:t>7/20/2021</a:t>
             </a:fld>
             <a:endParaRPr lang="en-US"/>
           </a:p>
@@ -31879,7 +31879,7 @@
           <a:p>
             <a:fld id="{5958763E-B898-436D-883D-03711491D54A}" type="datetimeFigureOut">
               <a:rPr lang="en-US" smtClean="0"/>
-              <a:t>5/28/2021</a:t>
+              <a:t>7/20/2021</a:t>
             </a:fld>
             <a:endParaRPr lang="en-US"/>
           </a:p>
@@ -32214,7 +32214,7 @@
           <a:p>
             <a:fld id="{5958763E-B898-436D-883D-03711491D54A}" type="datetimeFigureOut">
               <a:rPr lang="en-US" smtClean="0"/>
-              <a:t>5/28/2021</a:t>
+              <a:t>7/20/2021</a:t>
             </a:fld>
             <a:endParaRPr lang="en-US"/>
           </a:p>
@@ -32444,7 +32444,7 @@
           <a:p>
             <a:fld id="{5958763E-B898-436D-883D-03711491D54A}" type="datetimeFigureOut">
               <a:rPr lang="en-US" smtClean="0"/>
-              <a:t>5/28/2021</a:t>
+              <a:t>7/20/2021</a:t>
             </a:fld>
             <a:endParaRPr lang="en-US"/>
           </a:p>
@@ -32688,7 +32688,7 @@
           <a:p>
             <a:fld id="{5958763E-B898-436D-883D-03711491D54A}" type="datetimeFigureOut">
               <a:rPr lang="en-US" smtClean="0"/>
-              <a:t>5/28/2021</a:t>
+              <a:t>7/20/2021</a:t>
             </a:fld>
             <a:endParaRPr lang="en-US"/>
           </a:p>
@@ -36235,7 +36235,7 @@
 </file>
 
 <file path=ppt/slides/slide10.xml><?xml version="1.0" encoding="utf-8"?>
-<p:sld xmlns:a="http://schemas.openxmlformats.org/drawingml/2006/main" xmlns:r="http://schemas.openxmlformats.org/officeDocument/2006/relationships" xmlns:p="http://schemas.openxmlformats.org/presentationml/2006/main">
+<p:sld xmlns:a="http://schemas.openxmlformats.org/drawingml/2006/main" xmlns:r="http://schemas.openxmlformats.org/officeDocument/2006/relationships" xmlns:p="http://schemas.openxmlformats.org/presentationml/2006/main" show="0">
   <p:cSld>
     <p:spTree>
       <p:nvGrpSpPr>
@@ -37191,7 +37191,7 @@
 </file>
 
 <file path=ppt/slides/slide11.xml><?xml version="1.0" encoding="utf-8"?>
-<p:sld xmlns:a="http://schemas.openxmlformats.org/drawingml/2006/main" xmlns:r="http://schemas.openxmlformats.org/officeDocument/2006/relationships" xmlns:p="http://schemas.openxmlformats.org/presentationml/2006/main">
+<p:sld xmlns:a="http://schemas.openxmlformats.org/drawingml/2006/main" xmlns:r="http://schemas.openxmlformats.org/officeDocument/2006/relationships" xmlns:p="http://schemas.openxmlformats.org/presentationml/2006/main" show="0">
   <p:cSld>
     <p:bg>
       <p:bgPr>
@@ -38810,7 +38810,7 @@
 </file>
 
 <file path=ppt/slides/slide5.xml><?xml version="1.0" encoding="utf-8"?>
-<p:sld xmlns:a="http://schemas.openxmlformats.org/drawingml/2006/main" xmlns:r="http://schemas.openxmlformats.org/officeDocument/2006/relationships" xmlns:p="http://schemas.openxmlformats.org/presentationml/2006/main">
+<p:sld xmlns:a="http://schemas.openxmlformats.org/drawingml/2006/main" xmlns:r="http://schemas.openxmlformats.org/officeDocument/2006/relationships" xmlns:p="http://schemas.openxmlformats.org/presentationml/2006/main" show="0">
   <p:cSld>
     <p:spTree>
       <p:nvGrpSpPr>
@@ -39550,7 +39550,7 @@
 </file>
 
 <file path=ppt/slides/slide7.xml><?xml version="1.0" encoding="utf-8"?>
-<p:sld xmlns:a="http://schemas.openxmlformats.org/drawingml/2006/main" xmlns:r="http://schemas.openxmlformats.org/officeDocument/2006/relationships" xmlns:p="http://schemas.openxmlformats.org/presentationml/2006/main">
+<p:sld xmlns:a="http://schemas.openxmlformats.org/drawingml/2006/main" xmlns:r="http://schemas.openxmlformats.org/officeDocument/2006/relationships" xmlns:p="http://schemas.openxmlformats.org/presentationml/2006/main" show="0">
   <p:cSld>
     <p:spTree>
       <p:nvGrpSpPr>
@@ -39842,7 +39842,7 @@
 </file>
 
 <file path=ppt/slides/slide8.xml><?xml version="1.0" encoding="utf-8"?>
-<p:sld xmlns:a="http://schemas.openxmlformats.org/drawingml/2006/main" xmlns:r="http://schemas.openxmlformats.org/officeDocument/2006/relationships" xmlns:p="http://schemas.openxmlformats.org/presentationml/2006/main">
+<p:sld xmlns:a="http://schemas.openxmlformats.org/drawingml/2006/main" xmlns:r="http://schemas.openxmlformats.org/officeDocument/2006/relationships" xmlns:p="http://schemas.openxmlformats.org/presentationml/2006/main" show="0">
   <p:cSld>
     <p:spTree>
       <p:nvGrpSpPr>
@@ -40306,7 +40306,7 @@
 </file>
 
 <file path=ppt/slides/slide9.xml><?xml version="1.0" encoding="utf-8"?>
-<p:sld xmlns:a="http://schemas.openxmlformats.org/drawingml/2006/main" xmlns:r="http://schemas.openxmlformats.org/officeDocument/2006/relationships" xmlns:p="http://schemas.openxmlformats.org/presentationml/2006/main">
+<p:sld xmlns:a="http://schemas.openxmlformats.org/drawingml/2006/main" xmlns:r="http://schemas.openxmlformats.org/officeDocument/2006/relationships" xmlns:p="http://schemas.openxmlformats.org/presentationml/2006/main" show="0">
   <p:cSld>
     <p:bg>
       <p:bgPr>

</xml_diff>